<commit_message>
Saving updates to sections 1.2-1.4
</commit_message>
<xml_diff>
--- a/Section 1- Intro to DevOps/IntroDatabaseDevOps.pptx
+++ b/Section 1- Intro to DevOps/IntroDatabaseDevOps.pptx
@@ -7,6 +7,11 @@
   <p:sldIdLst>
     <p:sldId id="256" r:id="rId2"/>
     <p:sldId id="257" r:id="rId3"/>
+    <p:sldId id="259" r:id="rId4"/>
+    <p:sldId id="258" r:id="rId5"/>
+    <p:sldId id="261" r:id="rId6"/>
+    <p:sldId id="260" r:id="rId7"/>
+    <p:sldId id="262" r:id="rId8"/>
   </p:sldIdLst>
   <p:sldSz cx="12192000" cy="6858000"/>
   <p:notesSz cx="6858000" cy="9144000"/>
@@ -105,6 +110,11 @@
       </a:defRPr>
     </a:lvl9pPr>
   </p:defaultTextStyle>
+  <p:extLst>
+    <p:ext uri="{EFAFB233-063F-42B5-8137-9DF3F51BA10A}">
+      <p15:sldGuideLst xmlns:p15="http://schemas.microsoft.com/office/powerpoint/2012/main"/>
+    </p:ext>
+  </p:extLst>
 </p:presentation>
 </file>
 
@@ -153,7 +163,6 @@
               <a:rPr lang="en-US"/>
               <a:t>Click to edit Master title style</a:t>
             </a:r>
-            <a:endParaRPr lang="en-US"/>
           </a:p>
         </p:txBody>
       </p:sp>
@@ -218,7 +227,6 @@
               <a:rPr lang="en-US"/>
               <a:t>Click to edit Master subtitle style</a:t>
             </a:r>
-            <a:endParaRPr lang="en-US"/>
           </a:p>
         </p:txBody>
       </p:sp>
@@ -239,7 +247,7 @@
           <a:p>
             <a:fld id="{2402ECA0-9BE0-424F-B302-B69C667DF220}" type="datetimeFigureOut">
               <a:rPr lang="en-US" smtClean="0"/>
-              <a:t>1/18/2017</a:t>
+              <a:t>2/10/2017</a:t>
             </a:fld>
             <a:endParaRPr lang="en-US"/>
           </a:p>
@@ -336,7 +344,6 @@
               <a:rPr lang="en-US"/>
               <a:t>Click to edit Master title style</a:t>
             </a:r>
-            <a:endParaRPr lang="en-US"/>
           </a:p>
         </p:txBody>
       </p:sp>
@@ -388,7 +395,6 @@
               <a:rPr lang="en-US"/>
               <a:t>Fifth level</a:t>
             </a:r>
-            <a:endParaRPr lang="en-US"/>
           </a:p>
         </p:txBody>
       </p:sp>
@@ -409,7 +415,7 @@
           <a:p>
             <a:fld id="{2402ECA0-9BE0-424F-B302-B69C667DF220}" type="datetimeFigureOut">
               <a:rPr lang="en-US" smtClean="0"/>
-              <a:t>1/18/2017</a:t>
+              <a:t>2/10/2017</a:t>
             </a:fld>
             <a:endParaRPr lang="en-US"/>
           </a:p>
@@ -511,7 +517,6 @@
               <a:rPr lang="en-US"/>
               <a:t>Click to edit Master title style</a:t>
             </a:r>
-            <a:endParaRPr lang="en-US"/>
           </a:p>
         </p:txBody>
       </p:sp>
@@ -568,7 +573,6 @@
               <a:rPr lang="en-US"/>
               <a:t>Fifth level</a:t>
             </a:r>
-            <a:endParaRPr lang="en-US"/>
           </a:p>
         </p:txBody>
       </p:sp>
@@ -589,7 +593,7 @@
           <a:p>
             <a:fld id="{2402ECA0-9BE0-424F-B302-B69C667DF220}" type="datetimeFigureOut">
               <a:rPr lang="en-US" smtClean="0"/>
-              <a:t>1/18/2017</a:t>
+              <a:t>2/10/2017</a:t>
             </a:fld>
             <a:endParaRPr lang="en-US"/>
           </a:p>
@@ -686,7 +690,6 @@
               <a:rPr lang="en-US"/>
               <a:t>Click to edit Master title style</a:t>
             </a:r>
-            <a:endParaRPr lang="en-US"/>
           </a:p>
         </p:txBody>
       </p:sp>
@@ -738,7 +741,6 @@
               <a:rPr lang="en-US"/>
               <a:t>Fifth level</a:t>
             </a:r>
-            <a:endParaRPr lang="en-US"/>
           </a:p>
         </p:txBody>
       </p:sp>
@@ -759,7 +761,7 @@
           <a:p>
             <a:fld id="{2402ECA0-9BE0-424F-B302-B69C667DF220}" type="datetimeFigureOut">
               <a:rPr lang="en-US" smtClean="0"/>
-              <a:t>1/18/2017</a:t>
+              <a:t>2/10/2017</a:t>
             </a:fld>
             <a:endParaRPr lang="en-US"/>
           </a:p>
@@ -865,7 +867,6 @@
               <a:rPr lang="en-US"/>
               <a:t>Click to edit Master title style</a:t>
             </a:r>
-            <a:endParaRPr lang="en-US"/>
           </a:p>
         </p:txBody>
       </p:sp>
@@ -1005,7 +1006,7 @@
           <a:p>
             <a:fld id="{2402ECA0-9BE0-424F-B302-B69C667DF220}" type="datetimeFigureOut">
               <a:rPr lang="en-US" smtClean="0"/>
-              <a:t>1/18/2017</a:t>
+              <a:t>2/10/2017</a:t>
             </a:fld>
             <a:endParaRPr lang="en-US"/>
           </a:p>
@@ -1102,7 +1103,6 @@
               <a:rPr lang="en-US"/>
               <a:t>Click to edit Master title style</a:t>
             </a:r>
-            <a:endParaRPr lang="en-US"/>
           </a:p>
         </p:txBody>
       </p:sp>
@@ -1159,7 +1159,6 @@
               <a:rPr lang="en-US"/>
               <a:t>Fifth level</a:t>
             </a:r>
-            <a:endParaRPr lang="en-US"/>
           </a:p>
         </p:txBody>
       </p:sp>
@@ -1216,7 +1215,6 @@
               <a:rPr lang="en-US"/>
               <a:t>Fifth level</a:t>
             </a:r>
-            <a:endParaRPr lang="en-US"/>
           </a:p>
         </p:txBody>
       </p:sp>
@@ -1237,7 +1235,7 @@
           <a:p>
             <a:fld id="{2402ECA0-9BE0-424F-B302-B69C667DF220}" type="datetimeFigureOut">
               <a:rPr lang="en-US" smtClean="0"/>
-              <a:t>1/18/2017</a:t>
+              <a:t>2/10/2017</a:t>
             </a:fld>
             <a:endParaRPr lang="en-US"/>
           </a:p>
@@ -1339,7 +1337,6 @@
               <a:rPr lang="en-US"/>
               <a:t>Click to edit Master title style</a:t>
             </a:r>
-            <a:endParaRPr lang="en-US"/>
           </a:p>
         </p:txBody>
       </p:sp>
@@ -1461,7 +1458,6 @@
               <a:rPr lang="en-US"/>
               <a:t>Fifth level</a:t>
             </a:r>
-            <a:endParaRPr lang="en-US"/>
           </a:p>
         </p:txBody>
       </p:sp>
@@ -1583,7 +1579,6 @@
               <a:rPr lang="en-US"/>
               <a:t>Fifth level</a:t>
             </a:r>
-            <a:endParaRPr lang="en-US"/>
           </a:p>
         </p:txBody>
       </p:sp>
@@ -1604,7 +1599,7 @@
           <a:p>
             <a:fld id="{2402ECA0-9BE0-424F-B302-B69C667DF220}" type="datetimeFigureOut">
               <a:rPr lang="en-US" smtClean="0"/>
-              <a:t>1/18/2017</a:t>
+              <a:t>2/10/2017</a:t>
             </a:fld>
             <a:endParaRPr lang="en-US"/>
           </a:p>
@@ -1701,7 +1696,6 @@
               <a:rPr lang="en-US"/>
               <a:t>Click to edit Master title style</a:t>
             </a:r>
-            <a:endParaRPr lang="en-US"/>
           </a:p>
         </p:txBody>
       </p:sp>
@@ -1722,7 +1716,7 @@
           <a:p>
             <a:fld id="{2402ECA0-9BE0-424F-B302-B69C667DF220}" type="datetimeFigureOut">
               <a:rPr lang="en-US" smtClean="0"/>
-              <a:t>1/18/2017</a:t>
+              <a:t>2/10/2017</a:t>
             </a:fld>
             <a:endParaRPr lang="en-US"/>
           </a:p>
@@ -1817,7 +1811,7 @@
           <a:p>
             <a:fld id="{2402ECA0-9BE0-424F-B302-B69C667DF220}" type="datetimeFigureOut">
               <a:rPr lang="en-US" smtClean="0"/>
-              <a:t>1/18/2017</a:t>
+              <a:t>2/10/2017</a:t>
             </a:fld>
             <a:endParaRPr lang="en-US"/>
           </a:p>
@@ -1923,7 +1917,6 @@
               <a:rPr lang="en-US"/>
               <a:t>Click to edit Master title style</a:t>
             </a:r>
-            <a:endParaRPr lang="en-US"/>
           </a:p>
         </p:txBody>
       </p:sp>
@@ -2008,7 +2001,6 @@
               <a:rPr lang="en-US"/>
               <a:t>Fifth level</a:t>
             </a:r>
-            <a:endParaRPr lang="en-US"/>
           </a:p>
         </p:txBody>
       </p:sp>
@@ -2094,7 +2086,7 @@
           <a:p>
             <a:fld id="{2402ECA0-9BE0-424F-B302-B69C667DF220}" type="datetimeFigureOut">
               <a:rPr lang="en-US" smtClean="0"/>
-              <a:t>1/18/2017</a:t>
+              <a:t>2/10/2017</a:t>
             </a:fld>
             <a:endParaRPr lang="en-US"/>
           </a:p>
@@ -2200,7 +2192,6 @@
               <a:rPr lang="en-US"/>
               <a:t>Click to edit Master title style</a:t>
             </a:r>
-            <a:endParaRPr lang="en-US"/>
           </a:p>
         </p:txBody>
       </p:sp>
@@ -2347,7 +2338,7 @@
           <a:p>
             <a:fld id="{2402ECA0-9BE0-424F-B302-B69C667DF220}" type="datetimeFigureOut">
               <a:rPr lang="en-US" smtClean="0"/>
-              <a:t>1/18/2017</a:t>
+              <a:t>2/10/2017</a:t>
             </a:fld>
             <a:endParaRPr lang="en-US"/>
           </a:p>
@@ -2459,7 +2450,6 @@
               <a:rPr lang="en-US"/>
               <a:t>Click to edit Master title style</a:t>
             </a:r>
-            <a:endParaRPr lang="en-US"/>
           </a:p>
         </p:txBody>
       </p:sp>
@@ -2521,7 +2511,6 @@
               <a:rPr lang="en-US"/>
               <a:t>Fifth level</a:t>
             </a:r>
-            <a:endParaRPr lang="en-US"/>
           </a:p>
         </p:txBody>
       </p:sp>
@@ -2560,7 +2549,7 @@
           <a:p>
             <a:fld id="{2402ECA0-9BE0-424F-B302-B69C667DF220}" type="datetimeFigureOut">
               <a:rPr lang="en-US" smtClean="0"/>
-              <a:t>1/18/2017</a:t>
+              <a:t>2/10/2017</a:t>
             </a:fld>
             <a:endParaRPr lang="en-US"/>
           </a:p>
@@ -3075,15 +3064,54 @@
           <a:p>
             <a:r>
               <a:rPr lang="en-US" dirty="0"/>
-              <a:t>DevOps is transforming </a:t>
-            </a:r>
-            <a:r>
-              <a:rPr lang="en-US"/>
-              <a:t>software development</a:t>
-            </a:r>
-          </a:p>
-          <a:p>
-            <a:endParaRPr lang="en-US"/>
+              <a:t>In this course, you will learn how to:</a:t>
+            </a:r>
+          </a:p>
+          <a:p>
+            <a:pPr lvl="1"/>
+            <a:r>
+              <a:rPr lang="en-US" dirty="0"/>
+              <a:t>Define DevOps</a:t>
+            </a:r>
+          </a:p>
+          <a:p>
+            <a:pPr lvl="1"/>
+            <a:r>
+              <a:rPr lang="en-US" dirty="0" err="1"/>
+              <a:t>Indentify</a:t>
+            </a:r>
+            <a:r>
+              <a:rPr lang="en-US" dirty="0"/>
+              <a:t> the challenges of using databases that are separate from other software languages and platforms</a:t>
+            </a:r>
+          </a:p>
+          <a:p>
+            <a:pPr lvl="1"/>
+            <a:r>
+              <a:rPr lang="en-US" dirty="0"/>
+              <a:t>Include your database code alongside other application code in a version control system (VCS).</a:t>
+            </a:r>
+          </a:p>
+          <a:p>
+            <a:pPr lvl="1"/>
+            <a:r>
+              <a:rPr lang="en-US" dirty="0"/>
+              <a:t>Setup a Continuous Integration (CI) platform for your database code.</a:t>
+            </a:r>
+          </a:p>
+          <a:p>
+            <a:pPr lvl="1"/>
+            <a:r>
+              <a:rPr lang="en-US" dirty="0"/>
+              <a:t>Write and include automated unit tests for your database code.</a:t>
+            </a:r>
+          </a:p>
+          <a:p>
+            <a:pPr lvl="1"/>
+            <a:r>
+              <a:rPr lang="en-US" dirty="0"/>
+              <a:t>- Develop an automated release process that deploys database changes to both on premise and cloud databases.</a:t>
+            </a:r>
           </a:p>
         </p:txBody>
       </p:sp>
@@ -3091,6 +3119,455 @@
     <p:extLst>
       <p:ext uri="{BB962C8B-B14F-4D97-AF65-F5344CB8AC3E}">
         <p14:creationId xmlns:p14="http://schemas.microsoft.com/office/powerpoint/2010/main" val="131535962"/>
+      </p:ext>
+    </p:extLst>
+  </p:cSld>
+  <p:clrMapOvr>
+    <a:masterClrMapping/>
+  </p:clrMapOvr>
+</p:sld>
+</file>
+
+<file path=ppt/slides/slide3.xml><?xml version="1.0" encoding="utf-8"?>
+<p:sld xmlns:a="http://schemas.openxmlformats.org/drawingml/2006/main" xmlns:r="http://schemas.openxmlformats.org/officeDocument/2006/relationships" xmlns:p="http://schemas.openxmlformats.org/presentationml/2006/main">
+  <p:cSld>
+    <p:spTree>
+      <p:nvGrpSpPr>
+        <p:cNvPr id="1" name=""/>
+        <p:cNvGrpSpPr/>
+        <p:nvPr/>
+      </p:nvGrpSpPr>
+      <p:grpSpPr>
+        <a:xfrm>
+          <a:off x="0" y="0"/>
+          <a:ext cx="0" cy="0"/>
+          <a:chOff x="0" y="0"/>
+          <a:chExt cx="0" cy="0"/>
+        </a:xfrm>
+      </p:grpSpPr>
+      <p:sp>
+        <p:nvSpPr>
+          <p:cNvPr id="2" name="Title 1"/>
+          <p:cNvSpPr>
+            <a:spLocks noGrp="1"/>
+          </p:cNvSpPr>
+          <p:nvPr>
+            <p:ph type="title"/>
+          </p:nvPr>
+        </p:nvSpPr>
+        <p:spPr/>
+        <p:txBody>
+          <a:bodyPr/>
+          <a:lstStyle/>
+          <a:p>
+            <a:r>
+              <a:rPr lang="en-US" dirty="0"/>
+              <a:t>Course Structure</a:t>
+            </a:r>
+          </a:p>
+        </p:txBody>
+      </p:sp>
+      <p:sp>
+        <p:nvSpPr>
+          <p:cNvPr id="3" name="Content Placeholder 2"/>
+          <p:cNvSpPr>
+            <a:spLocks noGrp="1"/>
+          </p:cNvSpPr>
+          <p:nvPr>
+            <p:ph idx="1"/>
+          </p:nvPr>
+        </p:nvSpPr>
+        <p:spPr/>
+        <p:txBody>
+          <a:bodyPr/>
+          <a:lstStyle/>
+          <a:p>
+            <a:r>
+              <a:rPr lang="en-US" dirty="0"/>
+              <a:t>This course consists of</a:t>
+            </a:r>
+          </a:p>
+        </p:txBody>
+      </p:sp>
+    </p:spTree>
+    <p:extLst>
+      <p:ext uri="{BB962C8B-B14F-4D97-AF65-F5344CB8AC3E}">
+        <p14:creationId xmlns:p14="http://schemas.microsoft.com/office/powerpoint/2010/main" val="3810271598"/>
+      </p:ext>
+    </p:extLst>
+  </p:cSld>
+  <p:clrMapOvr>
+    <a:masterClrMapping/>
+  </p:clrMapOvr>
+</p:sld>
+</file>
+
+<file path=ppt/slides/slide4.xml><?xml version="1.0" encoding="utf-8"?>
+<p:sld xmlns:a="http://schemas.openxmlformats.org/drawingml/2006/main" xmlns:r="http://schemas.openxmlformats.org/officeDocument/2006/relationships" xmlns:p="http://schemas.openxmlformats.org/presentationml/2006/main">
+  <p:cSld>
+    <p:spTree>
+      <p:nvGrpSpPr>
+        <p:cNvPr id="1" name=""/>
+        <p:cNvGrpSpPr/>
+        <p:nvPr/>
+      </p:nvGrpSpPr>
+      <p:grpSpPr>
+        <a:xfrm>
+          <a:off x="0" y="0"/>
+          <a:ext cx="0" cy="0"/>
+          <a:chOff x="0" y="0"/>
+          <a:chExt cx="0" cy="0"/>
+        </a:xfrm>
+      </p:grpSpPr>
+      <p:sp>
+        <p:nvSpPr>
+          <p:cNvPr id="2" name="Title 1"/>
+          <p:cNvSpPr>
+            <a:spLocks noGrp="1"/>
+          </p:cNvSpPr>
+          <p:nvPr>
+            <p:ph type="title"/>
+          </p:nvPr>
+        </p:nvSpPr>
+        <p:spPr/>
+        <p:txBody>
+          <a:bodyPr/>
+          <a:lstStyle/>
+          <a:p>
+            <a:r>
+              <a:rPr lang="en-US" dirty="0"/>
+              <a:t>What is DevOps?</a:t>
+            </a:r>
+          </a:p>
+        </p:txBody>
+      </p:sp>
+      <p:sp>
+        <p:nvSpPr>
+          <p:cNvPr id="3" name="Content Placeholder 2"/>
+          <p:cNvSpPr>
+            <a:spLocks noGrp="1"/>
+          </p:cNvSpPr>
+          <p:nvPr>
+            <p:ph idx="1"/>
+          </p:nvPr>
+        </p:nvSpPr>
+        <p:spPr/>
+        <p:txBody>
+          <a:bodyPr/>
+          <a:lstStyle/>
+          <a:p>
+            <a:pPr marL="0" indent="0">
+              <a:buNone/>
+            </a:pPr>
+            <a:r>
+              <a:rPr lang="en-US" dirty="0"/>
+              <a:t>“DevOps is the union of people, process, and products to enable continuous delivery of value to our end users.”</a:t>
+            </a:r>
+          </a:p>
+          <a:p>
+            <a:pPr algn="r">
+              <a:buFontTx/>
+              <a:buChar char="-"/>
+            </a:pPr>
+            <a:r>
+              <a:rPr lang="en-US" i="1" dirty="0"/>
+              <a:t>Donovan Brown</a:t>
+            </a:r>
+          </a:p>
+          <a:p>
+            <a:pPr marL="0" indent="0" algn="r">
+              <a:buNone/>
+            </a:pPr>
+            <a:r>
+              <a:rPr lang="en-US" i="1" dirty="0"/>
+              <a:t>Microsoft Principal DevOps PM</a:t>
+            </a:r>
+          </a:p>
+          <a:p>
+            <a:pPr marL="0" indent="0" algn="r">
+              <a:buNone/>
+            </a:pPr>
+            <a:r>
+              <a:rPr lang="en-US" sz="1800" dirty="0"/>
+              <a:t>From </a:t>
+            </a:r>
+            <a:r>
+              <a:rPr lang="en-US" sz="1800" dirty="0">
+                <a:hlinkClick r:id="rId2" action="ppaction://hlinkfile"/>
+              </a:rPr>
+              <a:t>http://donovanbrown.com/post/what-is-devops</a:t>
+            </a:r>
+            <a:endParaRPr lang="en-US" sz="1800" dirty="0"/>
+          </a:p>
+        </p:txBody>
+      </p:sp>
+    </p:spTree>
+    <p:extLst>
+      <p:ext uri="{BB962C8B-B14F-4D97-AF65-F5344CB8AC3E}">
+        <p14:creationId xmlns:p14="http://schemas.microsoft.com/office/powerpoint/2010/main" val="1659003174"/>
+      </p:ext>
+    </p:extLst>
+  </p:cSld>
+  <p:clrMapOvr>
+    <a:masterClrMapping/>
+  </p:clrMapOvr>
+</p:sld>
+</file>
+
+<file path=ppt/slides/slide5.xml><?xml version="1.0" encoding="utf-8"?>
+<p:sld xmlns:a="http://schemas.openxmlformats.org/drawingml/2006/main" xmlns:r="http://schemas.openxmlformats.org/officeDocument/2006/relationships" xmlns:p="http://schemas.openxmlformats.org/presentationml/2006/main">
+  <p:cSld>
+    <p:spTree>
+      <p:nvGrpSpPr>
+        <p:cNvPr id="1" name=""/>
+        <p:cNvGrpSpPr/>
+        <p:nvPr/>
+      </p:nvGrpSpPr>
+      <p:grpSpPr>
+        <a:xfrm>
+          <a:off x="0" y="0"/>
+          <a:ext cx="0" cy="0"/>
+          <a:chOff x="0" y="0"/>
+          <a:chExt cx="0" cy="0"/>
+        </a:xfrm>
+      </p:grpSpPr>
+      <p:sp>
+        <p:nvSpPr>
+          <p:cNvPr id="2" name="Title 1"/>
+          <p:cNvSpPr>
+            <a:spLocks noGrp="1"/>
+          </p:cNvSpPr>
+          <p:nvPr>
+            <p:ph type="title"/>
+          </p:nvPr>
+        </p:nvSpPr>
+        <p:spPr/>
+        <p:txBody>
+          <a:bodyPr/>
+          <a:lstStyle/>
+          <a:p>
+            <a:r>
+              <a:rPr lang="en-US" dirty="0"/>
+              <a:t>What is DevOps?</a:t>
+            </a:r>
+          </a:p>
+        </p:txBody>
+      </p:sp>
+      <p:sp>
+        <p:nvSpPr>
+          <p:cNvPr id="3" name="Content Placeholder 2"/>
+          <p:cNvSpPr>
+            <a:spLocks noGrp="1"/>
+          </p:cNvSpPr>
+          <p:nvPr>
+            <p:ph idx="1"/>
+          </p:nvPr>
+        </p:nvSpPr>
+        <p:spPr/>
+        <p:txBody>
+          <a:bodyPr/>
+          <a:lstStyle/>
+          <a:p>
+            <a:pPr marL="0" indent="0">
+              <a:buNone/>
+            </a:pPr>
+            <a:r>
+              <a:rPr lang="en-US" i="1" dirty="0"/>
+              <a:t>“It is very important to realize that DevOps is not a product.  You cannot buy DevOps and install it.  DevOps is not just automation or infrastructure as code.  DevOps is people following a process enabled by products to deliver value to our end users.”</a:t>
+            </a:r>
+          </a:p>
+          <a:p>
+            <a:pPr marL="0" indent="0" algn="r">
+              <a:buNone/>
+            </a:pPr>
+            <a:r>
+              <a:rPr lang="en-US" dirty="0"/>
+              <a:t>- Donovan Brown</a:t>
+            </a:r>
+          </a:p>
+          <a:p>
+            <a:endParaRPr lang="en-US" dirty="0"/>
+          </a:p>
+        </p:txBody>
+      </p:sp>
+    </p:spTree>
+    <p:extLst>
+      <p:ext uri="{BB962C8B-B14F-4D97-AF65-F5344CB8AC3E}">
+        <p14:creationId xmlns:p14="http://schemas.microsoft.com/office/powerpoint/2010/main" val="2606710913"/>
+      </p:ext>
+    </p:extLst>
+  </p:cSld>
+  <p:clrMapOvr>
+    <a:masterClrMapping/>
+  </p:clrMapOvr>
+</p:sld>
+</file>
+
+<file path=ppt/slides/slide6.xml><?xml version="1.0" encoding="utf-8"?>
+<p:sld xmlns:a="http://schemas.openxmlformats.org/drawingml/2006/main" xmlns:r="http://schemas.openxmlformats.org/officeDocument/2006/relationships" xmlns:p="http://schemas.openxmlformats.org/presentationml/2006/main">
+  <p:cSld>
+    <p:spTree>
+      <p:nvGrpSpPr>
+        <p:cNvPr id="1" name=""/>
+        <p:cNvGrpSpPr/>
+        <p:nvPr/>
+      </p:nvGrpSpPr>
+      <p:grpSpPr>
+        <a:xfrm>
+          <a:off x="0" y="0"/>
+          <a:ext cx="0" cy="0"/>
+          <a:chOff x="0" y="0"/>
+          <a:chExt cx="0" cy="0"/>
+        </a:xfrm>
+      </p:grpSpPr>
+      <p:sp>
+        <p:nvSpPr>
+          <p:cNvPr id="2" name="Title 1"/>
+          <p:cNvSpPr>
+            <a:spLocks noGrp="1"/>
+          </p:cNvSpPr>
+          <p:nvPr>
+            <p:ph type="title"/>
+          </p:nvPr>
+        </p:nvSpPr>
+        <p:spPr/>
+        <p:txBody>
+          <a:bodyPr/>
+          <a:lstStyle/>
+          <a:p>
+            <a:r>
+              <a:rPr lang="en-US" dirty="0"/>
+              <a:t>The Three Ways</a:t>
+            </a:r>
+          </a:p>
+        </p:txBody>
+      </p:sp>
+      <p:sp>
+        <p:nvSpPr>
+          <p:cNvPr id="3" name="Content Placeholder 2"/>
+          <p:cNvSpPr>
+            <a:spLocks noGrp="1"/>
+          </p:cNvSpPr>
+          <p:nvPr>
+            <p:ph idx="1"/>
+          </p:nvPr>
+        </p:nvSpPr>
+        <p:spPr/>
+        <p:txBody>
+          <a:bodyPr/>
+          <a:lstStyle/>
+          <a:p>
+            <a:r>
+              <a:rPr lang="en-US" dirty="0"/>
+              <a:t>Gene Kim of The Phoenix Project and The DevOps Handbook, lists three core principles of DevOps</a:t>
+            </a:r>
+          </a:p>
+          <a:p>
+            <a:pPr lvl="1"/>
+            <a:r>
+              <a:rPr lang="en-US" dirty="0"/>
+              <a:t>Systems Thinking</a:t>
+            </a:r>
+          </a:p>
+          <a:p>
+            <a:pPr lvl="1"/>
+            <a:r>
+              <a:rPr lang="en-US" dirty="0"/>
+              <a:t>Feedback Loops</a:t>
+            </a:r>
+          </a:p>
+          <a:p>
+            <a:pPr lvl="1"/>
+            <a:r>
+              <a:rPr lang="en-US" dirty="0"/>
+              <a:t>Culture of Continuous Learning and Experimentation</a:t>
+            </a:r>
+          </a:p>
+          <a:p>
+            <a:endParaRPr lang="en-US" dirty="0"/>
+          </a:p>
+        </p:txBody>
+      </p:sp>
+    </p:spTree>
+    <p:extLst>
+      <p:ext uri="{BB962C8B-B14F-4D97-AF65-F5344CB8AC3E}">
+        <p14:creationId xmlns:p14="http://schemas.microsoft.com/office/powerpoint/2010/main" val="2497169468"/>
+      </p:ext>
+    </p:extLst>
+  </p:cSld>
+  <p:clrMapOvr>
+    <a:masterClrMapping/>
+  </p:clrMapOvr>
+</p:sld>
+</file>
+
+<file path=ppt/slides/slide7.xml><?xml version="1.0" encoding="utf-8"?>
+<p:sld xmlns:a="http://schemas.openxmlformats.org/drawingml/2006/main" xmlns:r="http://schemas.openxmlformats.org/officeDocument/2006/relationships" xmlns:p="http://schemas.openxmlformats.org/presentationml/2006/main">
+  <p:cSld>
+    <p:spTree>
+      <p:nvGrpSpPr>
+        <p:cNvPr id="1" name=""/>
+        <p:cNvGrpSpPr/>
+        <p:nvPr/>
+      </p:nvGrpSpPr>
+      <p:grpSpPr>
+        <a:xfrm>
+          <a:off x="0" y="0"/>
+          <a:ext cx="0" cy="0"/>
+          <a:chOff x="0" y="0"/>
+          <a:chExt cx="0" cy="0"/>
+        </a:xfrm>
+      </p:grpSpPr>
+      <p:sp>
+        <p:nvSpPr>
+          <p:cNvPr id="2" name="Title 1"/>
+          <p:cNvSpPr>
+            <a:spLocks noGrp="1"/>
+          </p:cNvSpPr>
+          <p:nvPr>
+            <p:ph type="title"/>
+          </p:nvPr>
+        </p:nvSpPr>
+        <p:spPr/>
+        <p:txBody>
+          <a:bodyPr/>
+          <a:lstStyle/>
+          <a:p>
+            <a:r>
+              <a:rPr lang="en-US" dirty="0"/>
+              <a:t>Challenges for </a:t>
+            </a:r>
+            <a:r>
+              <a:rPr lang="en-US"/>
+              <a:t>Database DevOps</a:t>
+            </a:r>
+            <a:endParaRPr lang="en-US"/>
+          </a:p>
+        </p:txBody>
+      </p:sp>
+      <p:sp>
+        <p:nvSpPr>
+          <p:cNvPr id="3" name="Content Placeholder 2"/>
+          <p:cNvSpPr>
+            <a:spLocks noGrp="1"/>
+          </p:cNvSpPr>
+          <p:nvPr>
+            <p:ph idx="1"/>
+          </p:nvPr>
+        </p:nvSpPr>
+        <p:spPr/>
+        <p:txBody>
+          <a:bodyPr/>
+          <a:lstStyle/>
+          <a:p>
+            <a:endParaRPr lang="en-US"/>
+          </a:p>
+        </p:txBody>
+      </p:sp>
+    </p:spTree>
+    <p:extLst>
+      <p:ext uri="{BB962C8B-B14F-4D97-AF65-F5344CB8AC3E}">
+        <p14:creationId xmlns:p14="http://schemas.microsoft.com/office/powerpoint/2010/main" val="511892221"/>
       </p:ext>
     </p:extLst>
   </p:cSld>

</xml_diff>